<commit_message>
Adding final version of jupyter notebook
</commit_message>
<xml_diff>
--- a/group7_transportation.pptx
+++ b/group7_transportation.pptx
@@ -15725,8 +15725,8 @@
         </p:nvSpPr>
         <p:spPr>
           <a:xfrm>
-            <a:off x="3097341" y="2839970"/>
-            <a:ext cx="996357" cy="997950"/>
+            <a:off x="2992723" y="2735185"/>
+            <a:ext cx="1205592" cy="1207520"/>
           </a:xfrm>
           <a:prstGeom prst="ellipse">
             <a:avLst/>
@@ -16071,14 +16071,14 @@
         </p:nvSpPr>
         <p:spPr>
           <a:xfrm>
-            <a:off x="5149351" y="2839970"/>
-            <a:ext cx="996357" cy="997950"/>
+            <a:off x="5044733" y="2735185"/>
+            <a:ext cx="1205592" cy="1207520"/>
           </a:xfrm>
           <a:prstGeom prst="ellipse">
             <a:avLst/>
           </a:prstGeom>
           <a:blipFill dpi="0" rotWithShape="1">
-            <a:blip r:embed="rId4" cstate="print">
+            <a:blip r:embed="rId5" cstate="print">
               <a:extLst>
                 <a:ext uri="{28A0092B-C50C-407E-A947-70E740481C1C}">
                   <a14:useLocalDpi xmlns:a14="http://schemas.microsoft.com/office/drawing/2010/main" val="0"/>
@@ -18604,7 +18604,7 @@
                   <a:schemeClr val="bg1"/>
                 </a:solidFill>
               </a:rPr>
-              <a:t>Youths are less prudent so when they have an accident it is more likely t to be serious/fatal</a:t>
+              <a:t>Youths are less prudent so when they have an accident it is more likely to be serious/fatal</a:t>
             </a:r>
           </a:p>
           <a:p>
@@ -19020,7 +19020,23 @@
                   <a:schemeClr val="bg1"/>
                 </a:solidFill>
               </a:rPr>
-              <a:t>Big bikes are harder to control, more risky. Not necessarily fatal</a:t>
+              <a:t>Big bikes are harder to control, more risky. Not necessarily fatal, riders are more experience (A2 </a:t>
+            </a:r>
+            <a:r>
+              <a:rPr lang="en-US" dirty="0" err="1">
+                <a:solidFill>
+                  <a:schemeClr val="bg1"/>
+                </a:solidFill>
+              </a:rPr>
+              <a:t>liscence</a:t>
+            </a:r>
+            <a:r>
+              <a:rPr lang="en-US" dirty="0">
+                <a:solidFill>
+                  <a:schemeClr val="bg1"/>
+                </a:solidFill>
+              </a:rPr>
+              <a:t>)</a:t>
             </a:r>
           </a:p>
           <a:p>
@@ -19695,45 +19711,6 @@
       </p:pic>
       <p:sp>
         <p:nvSpPr>
-          <p:cNvPr id="16" name="TextBox 5">
-            <a:extLst>
-              <a:ext uri="{FF2B5EF4-FFF2-40B4-BE49-F238E27FC236}">
-                <a16:creationId xmlns:a16="http://schemas.microsoft.com/office/drawing/2014/main" id="{C78E2D28-750C-4199-88CC-262442276FBC}"/>
-              </a:ext>
-            </a:extLst>
-          </p:cNvPr>
-          <p:cNvSpPr txBox="1"/>
-          <p:nvPr/>
-        </p:nvSpPr>
-        <p:spPr>
-          <a:xfrm>
-            <a:off x="-12320" y="6626627"/>
-            <a:ext cx="4648200" cy="276999"/>
-          </a:xfrm>
-          <a:prstGeom prst="rect">
-            <a:avLst/>
-          </a:prstGeom>
-          <a:noFill/>
-        </p:spPr>
-        <p:txBody>
-          <a:bodyPr wrap="square" rtlCol="0">
-            <a:spAutoFit/>
-          </a:bodyPr>
-          <a:lstStyle/>
-          <a:p>
-            <a:r>
-              <a:rPr lang="en-GB" sz="1200" dirty="0">
-                <a:solidFill>
-                  <a:schemeClr val="bg1"/>
-                </a:solidFill>
-              </a:rPr>
-              <a:t>*2016 Dataset</a:t>
-            </a:r>
-          </a:p>
-        </p:txBody>
-      </p:sp>
-      <p:sp>
-        <p:nvSpPr>
           <p:cNvPr id="9" name="Arrow: Right 22">
             <a:extLst>
               <a:ext uri="{FF2B5EF4-FFF2-40B4-BE49-F238E27FC236}">
@@ -20286,7 +20263,7 @@
             <a:avLst/>
           </a:prstGeom>
           <a:blipFill dpi="0" rotWithShape="1">
-            <a:blip r:embed="rId4" cstate="print">
+            <a:blip r:embed="rId5" cstate="print">
               <a:extLst>
                 <a:ext uri="{28A0092B-C50C-407E-A947-70E740481C1C}">
                   <a14:useLocalDpi xmlns:a14="http://schemas.microsoft.com/office/drawing/2010/main" val="0"/>

</xml_diff>